<commit_message>
Added slide on CoC, Etherpad.
</commit_message>
<xml_diff>
--- a/IntroductionConclusion.pptx
+++ b/IntroductionConclusion.pptx
@@ -5,7 +5,7 @@
     <p:sldMasterId id="2147483738" r:id="rId4"/>
   </p:sldMasterIdLst>
   <p:notesMasterIdLst>
-    <p:notesMasterId r:id="rId20"/>
+    <p:notesMasterId r:id="rId22"/>
   </p:notesMasterIdLst>
   <p:sldIdLst>
     <p:sldId id="616" r:id="rId5"/>
@@ -17,12 +17,14 @@
     <p:sldId id="653" r:id="rId11"/>
     <p:sldId id="629" r:id="rId12"/>
     <p:sldId id="630" r:id="rId13"/>
-    <p:sldId id="655" r:id="rId14"/>
-    <p:sldId id="658" r:id="rId15"/>
-    <p:sldId id="648" r:id="rId16"/>
-    <p:sldId id="649" r:id="rId17"/>
-    <p:sldId id="647" r:id="rId18"/>
-    <p:sldId id="643" r:id="rId19"/>
+    <p:sldId id="664" r:id="rId14"/>
+    <p:sldId id="665" r:id="rId15"/>
+    <p:sldId id="655" r:id="rId16"/>
+    <p:sldId id="658" r:id="rId17"/>
+    <p:sldId id="648" r:id="rId18"/>
+    <p:sldId id="649" r:id="rId19"/>
+    <p:sldId id="647" r:id="rId20"/>
+    <p:sldId id="643" r:id="rId21"/>
   </p:sldIdLst>
   <p:sldSz cx="9144000" cy="6858000" type="screen4x3"/>
   <p:notesSz cx="6858000" cy="9144000"/>
@@ -123,7 +125,7 @@
   </p:defaultTextStyle>
   <p:extLst>
     <p:ext uri="{EFAFB233-063F-42B5-8137-9DF3F51BA10A}">
-      <p15:sldGuideLst xmlns:p15="http://schemas.microsoft.com/office/powerpoint/2012/main">
+      <p15:sldGuideLst xmlns:p15="http://schemas.microsoft.com/office/powerpoint/2012/main" xmlns="">
         <p15:guide id="1" orient="horz" pos="2160">
           <p15:clr>
             <a:srgbClr val="A4A3A4"/>
@@ -227,7 +229,7 @@
             <a:fld id="{17BF77A4-95C4-49A7-B18D-D234C078783D}" type="datetimeFigureOut">
               <a:rPr lang="en-US" smtClean="0"/>
               <a:pPr/>
-              <a:t>1/23/2018</a:t>
+              <a:t>24/01/18</a:t>
             </a:fld>
             <a:endParaRPr lang="en-US"/>
           </a:p>
@@ -1462,7 +1464,7 @@
             <a:fld id="{D7F40DFA-B482-4AD0-A536-856EB395CEAD}" type="slidenum">
               <a:rPr lang="en-US" smtClean="0"/>
               <a:pPr/>
-              <a:t>11</a:t>
+              <a:t>13</a:t>
             </a:fld>
             <a:endParaRPr lang="en-US"/>
           </a:p>
@@ -1547,7 +1549,7 @@
             <a:fld id="{D7F40DFA-B482-4AD0-A536-856EB395CEAD}" type="slidenum">
               <a:rPr lang="en-US" smtClean="0"/>
               <a:pPr/>
-              <a:t>14</a:t>
+              <a:t>16</a:t>
             </a:fld>
             <a:endParaRPr lang="en-US"/>
           </a:p>
@@ -1649,7 +1651,7 @@
             <a:fld id="{D7F40DFA-B482-4AD0-A536-856EB395CEAD}" type="slidenum">
               <a:rPr lang="en-US" smtClean="0"/>
               <a:pPr/>
-              <a:t>15</a:t>
+              <a:t>17</a:t>
             </a:fld>
             <a:endParaRPr lang="en-US"/>
           </a:p>
@@ -2027,7 +2029,7 @@
           <a:p>
             <a:fld id="{90372C55-F32C-714E-85D4-4C85D67E2D89}" type="datetimeFigureOut">
               <a:rPr lang="en-US" smtClean="0"/>
-              <a:t>1/23/2018</a:t>
+              <a:t>24/01/18</a:t>
             </a:fld>
             <a:endParaRPr lang="en-US"/>
           </a:p>
@@ -2682,6 +2684,13 @@
           <a:bodyPr anchor="t" anchorCtr="0"/>
           <a:lstStyle/>
           <a:p>
+            <a:r>
+              <a:rPr lang="en-US" sz="6000" dirty="0">
+                <a:latin typeface="Helvetica"/>
+                <a:cs typeface="Helvetica"/>
+              </a:rPr>
+              <a:t/>
+            </a:r>
             <a:br>
               <a:rPr lang="en-US" sz="6000" dirty="0">
                 <a:latin typeface="Helvetica"/>
@@ -2695,15 +2704,31 @@
               </a:rPr>
               <a:t>Software Carpentry</a:t>
             </a:r>
+            <a:r>
+              <a:rPr lang="en-US" sz="1800" dirty="0"/>
+              <a:t/>
+            </a:r>
             <a:br>
               <a:rPr lang="en-US" sz="1800" dirty="0"/>
             </a:br>
+            <a:r>
+              <a:rPr lang="en-US" sz="1800" dirty="0"/>
+              <a:t/>
+            </a:r>
             <a:br>
               <a:rPr lang="en-US" sz="1800" dirty="0"/>
             </a:br>
+            <a:r>
+              <a:rPr lang="en-US" sz="1800" dirty="0"/>
+              <a:t/>
+            </a:r>
             <a:br>
               <a:rPr lang="en-US" sz="1800" dirty="0"/>
             </a:br>
+            <a:r>
+              <a:rPr lang="en-US" sz="1800" dirty="0"/>
+              <a:t/>
+            </a:r>
             <a:br>
               <a:rPr lang="en-US" sz="1800" dirty="0"/>
             </a:br>
@@ -2728,6 +2753,10 @@
             <a:br>
               <a:rPr lang="en-GB" sz="3200" dirty="0"/>
             </a:br>
+            <a:r>
+              <a:rPr lang="en-GB" sz="2400" dirty="0"/>
+              <a:t/>
+            </a:r>
             <a:br>
               <a:rPr lang="en-GB" sz="2400" dirty="0"/>
             </a:br>
@@ -2740,7 +2769,7 @@
           <p:cNvPr id="2056" name="Picture 8" descr="https://hpcarcher.github.io/2017-12-11-Imperial/img/software-carpentry-large.png">
             <a:extLst>
               <a:ext uri="{FF2B5EF4-FFF2-40B4-BE49-F238E27FC236}">
-                <a16:creationId xmlns:a16="http://schemas.microsoft.com/office/drawing/2014/main" id="{BC901FCD-191D-4E48-9224-7B99E983908A}"/>
+                <a16:creationId xmlns:a16="http://schemas.microsoft.com/office/drawing/2014/main" xmlns="" id="{BC901FCD-191D-4E48-9224-7B99E983908A}"/>
               </a:ext>
             </a:extLst>
           </p:cNvPr>
@@ -2780,7 +2809,7 @@
           <p:cNvPr id="8" name="Picture 7" descr="BetterSoftwareStickerImage.jpg">
             <a:extLst>
               <a:ext uri="{FF2B5EF4-FFF2-40B4-BE49-F238E27FC236}">
-                <a16:creationId xmlns:a16="http://schemas.microsoft.com/office/drawing/2014/main" id="{538D1416-BCEC-4E45-A727-C22B9F0924F0}"/>
+                <a16:creationId xmlns:a16="http://schemas.microsoft.com/office/drawing/2014/main" xmlns="" id="{538D1416-BCEC-4E45-A727-C22B9F0924F0}"/>
               </a:ext>
             </a:extLst>
           </p:cNvPr>
@@ -2824,7 +2853,7 @@
   <p:timing>
     <p:tnLst>
       <p:par>
-        <p:cTn id="1" dur="indefinite" restart="never" nodeType="tmRoot">
+        <p:cTn xmlns:p14="http://schemas.microsoft.com/office/powerpoint/2010/main" id="1" dur="indefinite" restart="never" nodeType="tmRoot">
           <p:childTnLst>
             <p:seq concurrent="1" nextAc="seek">
               <p:cTn id="2" dur="indefinite" nodeType="mainSeq">
@@ -2918,13 +2947,7 @@
       </p:grpSpPr>
       <p:sp>
         <p:nvSpPr>
-          <p:cNvPr id="2" name="Title 1">
-            <a:extLst>
-              <a:ext uri="{FF2B5EF4-FFF2-40B4-BE49-F238E27FC236}">
-                <a16:creationId xmlns:a16="http://schemas.microsoft.com/office/drawing/2014/main" id="{35C1724E-F97B-40BE-82E4-B29342DF35D7}"/>
-              </a:ext>
-            </a:extLst>
-          </p:cNvPr>
+          <p:cNvPr id="2" name="Title 1"/>
           <p:cNvSpPr>
             <a:spLocks noGrp="1"/>
           </p:cNvSpPr>
@@ -2937,19 +2960,17 @@
           <a:bodyPr/>
           <a:lstStyle/>
           <a:p>
-            <a:endParaRPr lang="en-GB"/>
+            <a:r>
+              <a:rPr lang="en-US" dirty="0" smtClean="0"/>
+              <a:t>Collaborative document</a:t>
+            </a:r>
+            <a:endParaRPr lang="en-US" dirty="0"/>
           </a:p>
         </p:txBody>
       </p:sp>
       <p:sp>
         <p:nvSpPr>
-          <p:cNvPr id="3" name="Content Placeholder 2">
-            <a:extLst>
-              <a:ext uri="{FF2B5EF4-FFF2-40B4-BE49-F238E27FC236}">
-                <a16:creationId xmlns:a16="http://schemas.microsoft.com/office/drawing/2014/main" id="{A660F5C2-8A54-4B60-98B0-5AADAAE94534}"/>
-              </a:ext>
-            </a:extLst>
-          </p:cNvPr>
+          <p:cNvPr id="3" name="Content Placeholder 2"/>
           <p:cNvSpPr>
             <a:spLocks noGrp="1"/>
           </p:cNvSpPr>
@@ -2962,14 +2983,82 @@
           <a:bodyPr/>
           <a:lstStyle/>
           <a:p>
-            <a:endParaRPr lang="en-GB"/>
+            <a:r>
+              <a:rPr lang="en-US" dirty="0" smtClean="0"/>
+              <a:t>Link available from Edinburgh carpentry site</a:t>
+            </a:r>
+          </a:p>
+          <a:p>
+            <a:pPr lvl="1"/>
+            <a:r>
+              <a:rPr lang="en-US" dirty="0">
+                <a:hlinkClick r:id="rId2"/>
+              </a:rPr>
+              <a:t>https://marioa.github.io/2018-02-19-edinburgh</a:t>
+            </a:r>
+            <a:r>
+              <a:rPr lang="en-US" dirty="0" smtClean="0">
+                <a:hlinkClick r:id="rId2"/>
+              </a:rPr>
+              <a:t>/</a:t>
+            </a:r>
+            <a:endParaRPr lang="en-US" dirty="0" smtClean="0"/>
+          </a:p>
+          <a:p>
+            <a:r>
+              <a:rPr lang="en-US" dirty="0" smtClean="0"/>
+              <a:t>Allows us to communicate with you:</a:t>
+            </a:r>
+          </a:p>
+          <a:p>
+            <a:pPr lvl="1"/>
+            <a:r>
+              <a:rPr lang="en-US" dirty="0" smtClean="0"/>
+              <a:t>Post long URLs</a:t>
+            </a:r>
+          </a:p>
+          <a:p>
+            <a:pPr lvl="1"/>
+            <a:r>
+              <a:rPr lang="en-US" dirty="0" smtClean="0"/>
+              <a:t>Code snippets</a:t>
+            </a:r>
+          </a:p>
+          <a:p>
+            <a:pPr lvl="1"/>
+            <a:r>
+              <a:rPr lang="en-US" dirty="0" smtClean="0"/>
+              <a:t>Tips/Comments from helpers/instructors</a:t>
+            </a:r>
+          </a:p>
+          <a:p>
+            <a:r>
+              <a:rPr lang="en-US" dirty="0" smtClean="0"/>
+              <a:t>You can share your notes with others</a:t>
+            </a:r>
+          </a:p>
+          <a:p>
+            <a:pPr lvl="1"/>
+            <a:r>
+              <a:rPr lang="en-US" sz="2400" dirty="0">
+                <a:hlinkClick r:id="rId3"/>
+              </a:rPr>
+              <a:t>http://pad.software-carpentry.org/2018-02-19-</a:t>
+            </a:r>
+            <a:r>
+              <a:rPr lang="en-US" sz="2400" dirty="0" smtClean="0">
+                <a:hlinkClick r:id="rId3"/>
+              </a:rPr>
+              <a:t>Edinburgh</a:t>
+            </a:r>
+            <a:endParaRPr lang="en-US" sz="2400" dirty="0" smtClean="0"/>
           </a:p>
         </p:txBody>
       </p:sp>
     </p:spTree>
     <p:extLst>
       <p:ext uri="{BB962C8B-B14F-4D97-AF65-F5344CB8AC3E}">
-        <p14:creationId xmlns:p14="http://schemas.microsoft.com/office/powerpoint/2010/main" val="2932096228"/>
+        <p14:creationId xmlns:p14="http://schemas.microsoft.com/office/powerpoint/2010/main" val="3065383376"/>
       </p:ext>
     </p:extLst>
   </p:cSld>
@@ -2998,10 +3087,119 @@
       </p:grpSpPr>
       <p:sp>
         <p:nvSpPr>
+          <p:cNvPr id="2" name="Title 1"/>
+          <p:cNvSpPr>
+            <a:spLocks noGrp="1"/>
+          </p:cNvSpPr>
+          <p:nvPr>
+            <p:ph type="title"/>
+          </p:nvPr>
+        </p:nvSpPr>
+        <p:spPr/>
+        <p:txBody>
+          <a:bodyPr/>
+          <a:lstStyle/>
+          <a:p>
+            <a:r>
+              <a:rPr lang="en-US" dirty="0" smtClean="0"/>
+              <a:t>Code of Conduct</a:t>
+            </a:r>
+            <a:endParaRPr lang="en-US" dirty="0"/>
+          </a:p>
+        </p:txBody>
+      </p:sp>
+      <p:sp>
+        <p:nvSpPr>
+          <p:cNvPr id="3" name="Content Placeholder 2"/>
+          <p:cNvSpPr>
+            <a:spLocks noGrp="1"/>
+          </p:cNvSpPr>
+          <p:nvPr>
+            <p:ph idx="1"/>
+          </p:nvPr>
+        </p:nvSpPr>
+        <p:spPr/>
+        <p:txBody>
+          <a:bodyPr/>
+          <a:lstStyle/>
+          <a:p>
+            <a:r>
+              <a:rPr lang="en-US" dirty="0" smtClean="0"/>
+              <a:t>Details:</a:t>
+            </a:r>
+          </a:p>
+          <a:p>
+            <a:pPr lvl="1"/>
+            <a:r>
+              <a:rPr lang="en-US" dirty="0">
+                <a:hlinkClick r:id="rId2"/>
+              </a:rPr>
+              <a:t>https://software-carpentry.org/conduct</a:t>
+            </a:r>
+            <a:r>
+              <a:rPr lang="en-US" dirty="0" smtClean="0">
+                <a:hlinkClick r:id="rId2"/>
+              </a:rPr>
+              <a:t>/</a:t>
+            </a:r>
+            <a:endParaRPr lang="en-US" dirty="0" smtClean="0"/>
+          </a:p>
+          <a:p>
+            <a:r>
+              <a:rPr lang="en-US" dirty="0" smtClean="0"/>
+              <a:t>Essentially:</a:t>
+            </a:r>
+          </a:p>
+          <a:p>
+            <a:pPr lvl="1"/>
+            <a:r>
+              <a:rPr lang="en-US" i="1" dirty="0" smtClean="0"/>
+              <a:t>Be courteous and nice to each other</a:t>
+            </a:r>
+            <a:r>
+              <a:rPr lang="en-US" dirty="0" smtClean="0"/>
+              <a:t>.</a:t>
+            </a:r>
+            <a:endParaRPr lang="en-US" dirty="0"/>
+          </a:p>
+        </p:txBody>
+      </p:sp>
+    </p:spTree>
+    <p:extLst>
+      <p:ext uri="{BB962C8B-B14F-4D97-AF65-F5344CB8AC3E}">
+        <p14:creationId xmlns:p14="http://schemas.microsoft.com/office/powerpoint/2010/main" val="4064759512"/>
+      </p:ext>
+    </p:extLst>
+  </p:cSld>
+  <p:clrMapOvr>
+    <a:masterClrMapping/>
+  </p:clrMapOvr>
+</p:sld>
+</file>
+
+<file path=ppt/slides/slide12.xml><?xml version="1.0" encoding="utf-8"?>
+<p:sld xmlns:a="http://schemas.openxmlformats.org/drawingml/2006/main" xmlns:r="http://schemas.openxmlformats.org/officeDocument/2006/relationships" xmlns:p="http://schemas.openxmlformats.org/presentationml/2006/main">
+  <p:cSld>
+    <p:spTree>
+      <p:nvGrpSpPr>
+        <p:cNvPr id="1" name=""/>
+        <p:cNvGrpSpPr/>
+        <p:nvPr/>
+      </p:nvGrpSpPr>
+      <p:grpSpPr>
+        <a:xfrm>
+          <a:off x="0" y="0"/>
+          <a:ext cx="0" cy="0"/>
+          <a:chOff x="0" y="0"/>
+          <a:chExt cx="0" cy="0"/>
+        </a:xfrm>
+      </p:grpSpPr>
+      <p:sp>
+        <p:nvSpPr>
           <p:cNvPr id="2" name="Title 1">
             <a:extLst>
               <a:ext uri="{FF2B5EF4-FFF2-40B4-BE49-F238E27FC236}">
-                <a16:creationId xmlns:a16="http://schemas.microsoft.com/office/drawing/2014/main" id="{A54344FB-A27D-4B84-A6C7-D361547140C6}"/>
+                <a16:creationId xmlns:a16="http://schemas.microsoft.com/office/drawing/2014/main" xmlns="" id="{35C1724E-F97B-40BE-82E4-B29342DF35D7}"/>
               </a:ext>
             </a:extLst>
           </p:cNvPr>
@@ -3017,6 +3215,86 @@
           <a:bodyPr/>
           <a:lstStyle/>
           <a:p>
+            <a:endParaRPr lang="en-GB"/>
+          </a:p>
+        </p:txBody>
+      </p:sp>
+      <p:sp>
+        <p:nvSpPr>
+          <p:cNvPr id="3" name="Content Placeholder 2">
+            <a:extLst>
+              <a:ext uri="{FF2B5EF4-FFF2-40B4-BE49-F238E27FC236}">
+                <a16:creationId xmlns:a16="http://schemas.microsoft.com/office/drawing/2014/main" xmlns="" id="{A660F5C2-8A54-4B60-98B0-5AADAAE94534}"/>
+              </a:ext>
+            </a:extLst>
+          </p:cNvPr>
+          <p:cNvSpPr>
+            <a:spLocks noGrp="1"/>
+          </p:cNvSpPr>
+          <p:nvPr>
+            <p:ph idx="1"/>
+          </p:nvPr>
+        </p:nvSpPr>
+        <p:spPr/>
+        <p:txBody>
+          <a:bodyPr/>
+          <a:lstStyle/>
+          <a:p>
+            <a:endParaRPr lang="en-GB"/>
+          </a:p>
+        </p:txBody>
+      </p:sp>
+    </p:spTree>
+    <p:extLst>
+      <p:ext uri="{BB962C8B-B14F-4D97-AF65-F5344CB8AC3E}">
+        <p14:creationId xmlns:p14="http://schemas.microsoft.com/office/powerpoint/2010/main" val="2932096228"/>
+      </p:ext>
+    </p:extLst>
+  </p:cSld>
+  <p:clrMapOvr>
+    <a:masterClrMapping/>
+  </p:clrMapOvr>
+</p:sld>
+</file>
+
+<file path=ppt/slides/slide13.xml><?xml version="1.0" encoding="utf-8"?>
+<p:sld xmlns:a="http://schemas.openxmlformats.org/drawingml/2006/main" xmlns:r="http://schemas.openxmlformats.org/officeDocument/2006/relationships" xmlns:p="http://schemas.openxmlformats.org/presentationml/2006/main">
+  <p:cSld>
+    <p:spTree>
+      <p:nvGrpSpPr>
+        <p:cNvPr id="1" name=""/>
+        <p:cNvGrpSpPr/>
+        <p:nvPr/>
+      </p:nvGrpSpPr>
+      <p:grpSpPr>
+        <a:xfrm>
+          <a:off x="0" y="0"/>
+          <a:ext cx="0" cy="0"/>
+          <a:chOff x="0" y="0"/>
+          <a:chExt cx="0" cy="0"/>
+        </a:xfrm>
+      </p:grpSpPr>
+      <p:sp>
+        <p:nvSpPr>
+          <p:cNvPr id="2" name="Title 1">
+            <a:extLst>
+              <a:ext uri="{FF2B5EF4-FFF2-40B4-BE49-F238E27FC236}">
+                <a16:creationId xmlns:a16="http://schemas.microsoft.com/office/drawing/2014/main" xmlns="" id="{A54344FB-A27D-4B84-A6C7-D361547140C6}"/>
+              </a:ext>
+            </a:extLst>
+          </p:cNvPr>
+          <p:cNvSpPr>
+            <a:spLocks noGrp="1"/>
+          </p:cNvSpPr>
+          <p:nvPr>
+            <p:ph type="title"/>
+          </p:nvPr>
+        </p:nvSpPr>
+        <p:spPr/>
+        <p:txBody>
+          <a:bodyPr/>
+          <a:lstStyle/>
+          <a:p>
             <a:endParaRPr lang="en-GB" dirty="0"/>
           </a:p>
         </p:txBody>
@@ -3026,7 +3304,7 @@
           <p:cNvPr id="7" name="TextBox 8">
             <a:extLst>
               <a:ext uri="{FF2B5EF4-FFF2-40B4-BE49-F238E27FC236}">
-                <a16:creationId xmlns:a16="http://schemas.microsoft.com/office/drawing/2014/main" id="{D815040F-54E3-4DC1-AEA7-6A960A1118F1}"/>
+                <a16:creationId xmlns:a16="http://schemas.microsoft.com/office/drawing/2014/main" xmlns="" id="{D815040F-54E3-4DC1-AEA7-6A960A1118F1}"/>
               </a:ext>
             </a:extLst>
           </p:cNvPr>
@@ -3048,14 +3326,14 @@
             <a:noFill/>
           </a:ln>
           <a:extLst>
-            <a:ext uri="{909E8E84-426E-40DD-AFC4-6F175D3DCCD1}">
+            <a:ext uri="{909E8E84-426E-40dd-AFC4-6F175D3DCCD1}">
               <a14:hiddenFill xmlns:a14="http://schemas.microsoft.com/office/drawing/2010/main">
                 <a:solidFill>
                   <a:srgbClr val="FFFFFF"/>
                 </a:solidFill>
               </a14:hiddenFill>
             </a:ext>
-            <a:ext uri="{91240B29-F687-4F45-9708-019B960494DF}">
+            <a:ext uri="{91240B29-F687-4f45-9708-019B960494DF}">
               <a14:hiddenLine xmlns:a14="http://schemas.microsoft.com/office/drawing/2010/main" w="9525">
                 <a:solidFill>
                   <a:srgbClr val="000000"/>
@@ -3248,7 +3526,7 @@
           <p:cNvPr id="6" name="Picture 5">
             <a:extLst>
               <a:ext uri="{FF2B5EF4-FFF2-40B4-BE49-F238E27FC236}">
-                <a16:creationId xmlns:a16="http://schemas.microsoft.com/office/drawing/2014/main" id="{48BB4C2B-97C1-49F6-8018-F858C3F26A42}"/>
+                <a16:creationId xmlns:a16="http://schemas.microsoft.com/office/drawing/2014/main" xmlns="" id="{48BB4C2B-97C1-49F6-8018-F858C3F26A42}"/>
               </a:ext>
             </a:extLst>
           </p:cNvPr>
@@ -3286,7 +3564,7 @@
 </p:sld>
 </file>
 
-<file path=ppt/slides/slide12.xml><?xml version="1.0" encoding="utf-8"?>
+<file path=ppt/slides/slide14.xml><?xml version="1.0" encoding="utf-8"?>
 <p:sld xmlns:a="http://schemas.openxmlformats.org/drawingml/2006/main" xmlns:r="http://schemas.openxmlformats.org/officeDocument/2006/relationships" xmlns:p="http://schemas.openxmlformats.org/presentationml/2006/main">
   <p:cSld>
     <p:spTree>
@@ -4175,7 +4453,7 @@
           </a:prstGeom>
           <a:noFill/>
           <a:extLst>
-            <a:ext uri="{909E8E84-426E-40DD-AFC4-6F175D3DCCD1}">
+            <a:ext uri="{909E8E84-426E-40dd-AFC4-6F175D3DCCD1}">
               <a14:hiddenFill xmlns:a14="http://schemas.microsoft.com/office/drawing/2010/main">
                 <a:solidFill>
                   <a:srgbClr val="FFFFFF"/>
@@ -4283,7 +4561,7 @@
 </p:sld>
 </file>
 
-<file path=ppt/slides/slide13.xml><?xml version="1.0" encoding="utf-8"?>
+<file path=ppt/slides/slide15.xml><?xml version="1.0" encoding="utf-8"?>
 <p:sld xmlns:a="http://schemas.openxmlformats.org/drawingml/2006/main" xmlns:r="http://schemas.openxmlformats.org/officeDocument/2006/relationships" xmlns:p="http://schemas.openxmlformats.org/presentationml/2006/main">
   <p:cSld>
     <p:spTree>
@@ -4305,7 +4583,7 @@
           <p:cNvPr id="2" name="Title 1">
             <a:extLst>
               <a:ext uri="{FF2B5EF4-FFF2-40B4-BE49-F238E27FC236}">
-                <a16:creationId xmlns:a16="http://schemas.microsoft.com/office/drawing/2014/main" id="{0A3A8724-7894-4017-9060-DCB06C0A44DB}"/>
+                <a16:creationId xmlns:a16="http://schemas.microsoft.com/office/drawing/2014/main" xmlns="" id="{0A3A8724-7894-4017-9060-DCB06C0A44DB}"/>
               </a:ext>
             </a:extLst>
           </p:cNvPr>
@@ -4333,7 +4611,7 @@
           <p:cNvPr id="3" name="Content Placeholder 2">
             <a:extLst>
               <a:ext uri="{FF2B5EF4-FFF2-40B4-BE49-F238E27FC236}">
-                <a16:creationId xmlns:a16="http://schemas.microsoft.com/office/drawing/2014/main" id="{E7D15EFD-F7F1-4563-B5D9-AA50D655CFFE}"/>
+                <a16:creationId xmlns:a16="http://schemas.microsoft.com/office/drawing/2014/main" xmlns="" id="{E7D15EFD-F7F1-4563-B5D9-AA50D655CFFE}"/>
               </a:ext>
             </a:extLst>
           </p:cNvPr>
@@ -4381,7 +4659,7 @@
           <p:cNvPr id="4" name="Content Placeholder 2">
             <a:extLst>
               <a:ext uri="{FF2B5EF4-FFF2-40B4-BE49-F238E27FC236}">
-                <a16:creationId xmlns:a16="http://schemas.microsoft.com/office/drawing/2014/main" id="{7D5814C1-A55A-4CC5-B9BC-B84132CCF29C}"/>
+                <a16:creationId xmlns:a16="http://schemas.microsoft.com/office/drawing/2014/main" xmlns="" id="{7D5814C1-A55A-4CC5-B9BC-B84132CCF29C}"/>
               </a:ext>
             </a:extLst>
           </p:cNvPr>
@@ -4565,7 +4843,7 @@
           <p:cNvPr id="5" name="Shape 155">
             <a:extLst>
               <a:ext uri="{FF2B5EF4-FFF2-40B4-BE49-F238E27FC236}">
-                <a16:creationId xmlns:a16="http://schemas.microsoft.com/office/drawing/2014/main" id="{9F39AAA1-1EF2-4A20-AC0F-1E05CFC014C5}"/>
+                <a16:creationId xmlns:a16="http://schemas.microsoft.com/office/drawing/2014/main" xmlns="" id="{9F39AAA1-1EF2-4A20-AC0F-1E05CFC014C5}"/>
               </a:ext>
             </a:extLst>
           </p:cNvPr>
@@ -4602,7 +4880,7 @@
           <p:cNvPr id="6" name="Shape 156" descr="DC1_logo.png">
             <a:extLst>
               <a:ext uri="{FF2B5EF4-FFF2-40B4-BE49-F238E27FC236}">
-                <a16:creationId xmlns:a16="http://schemas.microsoft.com/office/drawing/2014/main" id="{6E5C0632-EE86-457B-A304-5969C85E86A6}"/>
+                <a16:creationId xmlns:a16="http://schemas.microsoft.com/office/drawing/2014/main" xmlns="" id="{6E5C0632-EE86-457B-A304-5969C85E86A6}"/>
               </a:ext>
             </a:extLst>
           </p:cNvPr>
@@ -4647,7 +4925,7 @@
 </p:sld>
 </file>
 
-<file path=ppt/slides/slide14.xml><?xml version="1.0" encoding="utf-8"?>
+<file path=ppt/slides/slide16.xml><?xml version="1.0" encoding="utf-8"?>
 <p:sld xmlns:a="http://schemas.openxmlformats.org/drawingml/2006/main" xmlns:r="http://schemas.openxmlformats.org/officeDocument/2006/relationships" xmlns:p="http://schemas.openxmlformats.org/presentationml/2006/main">
   <p:cSld>
     <p:spTree>
@@ -4706,14 +4984,14 @@
           </a:prstGeom>
           <a:noFill/>
           <a:extLst>
-            <a:ext uri="{909E8E84-426E-40DD-AFC4-6F175D3DCCD1}">
+            <a:ext uri="{909E8E84-426E-40dd-AFC4-6F175D3DCCD1}">
               <a14:hiddenFill xmlns:a14="http://schemas.microsoft.com/office/drawing/2010/main">
                 <a:solidFill>
                   <a:srgbClr val="FFFFFF"/>
                 </a:solidFill>
               </a14:hiddenFill>
             </a:ext>
-            <a:ext uri="{91240B29-F687-4F45-9708-019B960494DF}">
+            <a:ext uri="{91240B29-F687-4f45-9708-019B960494DF}">
               <a14:hiddenLine xmlns:a14="http://schemas.microsoft.com/office/drawing/2010/main" w="9525">
                 <a:solidFill>
                   <a:srgbClr val="000000"/>
@@ -4957,14 +5235,14 @@
             <a:noFill/>
           </a:ln>
           <a:extLst>
-            <a:ext uri="{909E8E84-426E-40DD-AFC4-6F175D3DCCD1}">
+            <a:ext uri="{909E8E84-426E-40dd-AFC4-6F175D3DCCD1}">
               <a14:hiddenFill xmlns:a14="http://schemas.microsoft.com/office/drawing/2010/main">
                 <a:solidFill>
                   <a:srgbClr val="FFFFFF"/>
                 </a:solidFill>
               </a14:hiddenFill>
             </a:ext>
-            <a:ext uri="{91240B29-F687-4F45-9708-019B960494DF}">
+            <a:ext uri="{91240B29-F687-4f45-9708-019B960494DF}">
               <a14:hiddenLine xmlns:a14="http://schemas.microsoft.com/office/drawing/2010/main" w="9525">
                 <a:solidFill>
                   <a:srgbClr val="000000"/>
@@ -5011,14 +5289,14 @@
             <a:noFill/>
           </a:ln>
           <a:extLst>
-            <a:ext uri="{909E8E84-426E-40DD-AFC4-6F175D3DCCD1}">
+            <a:ext uri="{909E8E84-426E-40dd-AFC4-6F175D3DCCD1}">
               <a14:hiddenFill xmlns:a14="http://schemas.microsoft.com/office/drawing/2010/main">
                 <a:solidFill>
                   <a:srgbClr val="FFFFFF"/>
                 </a:solidFill>
               </a14:hiddenFill>
             </a:ext>
-            <a:ext uri="{91240B29-F687-4F45-9708-019B960494DF}">
+            <a:ext uri="{91240B29-F687-4f45-9708-019B960494DF}">
               <a14:hiddenLine xmlns:a14="http://schemas.microsoft.com/office/drawing/2010/main" w="9525">
                 <a:solidFill>
                   <a:srgbClr val="000000"/>
@@ -5065,14 +5343,14 @@
             <a:noFill/>
           </a:ln>
           <a:extLst>
-            <a:ext uri="{909E8E84-426E-40DD-AFC4-6F175D3DCCD1}">
+            <a:ext uri="{909E8E84-426E-40dd-AFC4-6F175D3DCCD1}">
               <a14:hiddenFill xmlns:a14="http://schemas.microsoft.com/office/drawing/2010/main">
                 <a:solidFill>
                   <a:srgbClr val="FFFFFF"/>
                 </a:solidFill>
               </a14:hiddenFill>
             </a:ext>
-            <a:ext uri="{91240B29-F687-4F45-9708-019B960494DF}">
+            <a:ext uri="{91240B29-F687-4f45-9708-019B960494DF}">
               <a14:hiddenLine xmlns:a14="http://schemas.microsoft.com/office/drawing/2010/main" w="9525">
                 <a:solidFill>
                   <a:srgbClr val="000000"/>
@@ -5090,7 +5368,7 @@
           <p:cNvPr id="3" name="Picture 2">
             <a:extLst>
               <a:ext uri="{FF2B5EF4-FFF2-40B4-BE49-F238E27FC236}">
-                <a16:creationId xmlns:a16="http://schemas.microsoft.com/office/drawing/2014/main" id="{06C8179E-DD15-4B52-B2AB-781D3FD1E7C7}"/>
+                <a16:creationId xmlns:a16="http://schemas.microsoft.com/office/drawing/2014/main" xmlns="" id="{06C8179E-DD15-4B52-B2AB-781D3FD1E7C7}"/>
               </a:ext>
             </a:extLst>
           </p:cNvPr>
@@ -5125,7 +5403,7 @@
           <p:cNvPr id="9" name="Picture 8">
             <a:extLst>
               <a:ext uri="{FF2B5EF4-FFF2-40B4-BE49-F238E27FC236}">
-                <a16:creationId xmlns:a16="http://schemas.microsoft.com/office/drawing/2014/main" id="{CD78DA23-B88C-4F81-8104-4B51CC58B810}"/>
+                <a16:creationId xmlns:a16="http://schemas.microsoft.com/office/drawing/2014/main" xmlns="" id="{CD78DA23-B88C-4F81-8104-4B51CC58B810}"/>
               </a:ext>
             </a:extLst>
           </p:cNvPr>
@@ -5168,7 +5446,7 @@
 </p:sld>
 </file>
 
-<file path=ppt/slides/slide15.xml><?xml version="1.0" encoding="utf-8"?>
+<file path=ppt/slides/slide17.xml><?xml version="1.0" encoding="utf-8"?>
 <p:sld xmlns:a="http://schemas.openxmlformats.org/drawingml/2006/main" xmlns:r="http://schemas.openxmlformats.org/officeDocument/2006/relationships" xmlns:p="http://schemas.openxmlformats.org/presentationml/2006/main">
   <p:cSld>
     <p:spTree>
@@ -5248,7 +5526,7 @@
             <a:tailEnd/>
           </a:ln>
           <a:extLst>
-            <a:ext uri="{909E8E84-426E-40DD-AFC4-6F175D3DCCD1}">
+            <a:ext uri="{909E8E84-426E-40dd-AFC4-6F175D3DCCD1}">
               <a14:hiddenFill xmlns:a14="http://schemas.microsoft.com/office/drawing/2010/main">
                 <a:solidFill>
                   <a:schemeClr val="accent1"/>
@@ -5501,7 +5779,7 @@
           </a:prstGeom>
           <a:noFill/>
           <a:extLst>
-            <a:ext uri="{909E8E84-426E-40DD-AFC4-6F175D3DCCD1}">
+            <a:ext uri="{909E8E84-426E-40dd-AFC4-6F175D3DCCD1}">
               <a14:hiddenFill xmlns:a14="http://schemas.microsoft.com/office/drawing/2010/main">
                 <a:solidFill>
                   <a:srgbClr val="FFFFFF"/>
@@ -5545,14 +5823,14 @@
             <a:noFill/>
           </a:ln>
           <a:extLst>
-            <a:ext uri="{909E8E84-426E-40DD-AFC4-6F175D3DCCD1}">
+            <a:ext uri="{909E8E84-426E-40dd-AFC4-6F175D3DCCD1}">
               <a14:hiddenFill xmlns:a14="http://schemas.microsoft.com/office/drawing/2010/main">
                 <a:solidFill>
                   <a:srgbClr val="FFFFFF"/>
                 </a:solidFill>
               </a14:hiddenFill>
             </a:ext>
-            <a:ext uri="{91240B29-F687-4F45-9708-019B960494DF}">
+            <a:ext uri="{91240B29-F687-4f45-9708-019B960494DF}">
               <a14:hiddenLine xmlns:a14="http://schemas.microsoft.com/office/drawing/2010/main" w="9525">
                 <a:solidFill>
                   <a:srgbClr val="000000"/>
@@ -5599,14 +5877,14 @@
             <a:noFill/>
           </a:ln>
           <a:extLst>
-            <a:ext uri="{909E8E84-426E-40DD-AFC4-6F175D3DCCD1}">
+            <a:ext uri="{909E8E84-426E-40dd-AFC4-6F175D3DCCD1}">
               <a14:hiddenFill xmlns:a14="http://schemas.microsoft.com/office/drawing/2010/main">
                 <a:solidFill>
                   <a:srgbClr val="FFFFFF"/>
                 </a:solidFill>
               </a14:hiddenFill>
             </a:ext>
-            <a:ext uri="{91240B29-F687-4F45-9708-019B960494DF}">
+            <a:ext uri="{91240B29-F687-4f45-9708-019B960494DF}">
               <a14:hiddenLine xmlns:a14="http://schemas.microsoft.com/office/drawing/2010/main" w="9525">
                 <a:solidFill>
                   <a:srgbClr val="000000"/>
@@ -5653,14 +5931,14 @@
             <a:noFill/>
           </a:ln>
           <a:extLst>
-            <a:ext uri="{909E8E84-426E-40DD-AFC4-6F175D3DCCD1}">
+            <a:ext uri="{909E8E84-426E-40dd-AFC4-6F175D3DCCD1}">
               <a14:hiddenFill xmlns:a14="http://schemas.microsoft.com/office/drawing/2010/main">
                 <a:solidFill>
                   <a:srgbClr val="FFFFFF"/>
                 </a:solidFill>
               </a14:hiddenFill>
             </a:ext>
-            <a:ext uri="{91240B29-F687-4F45-9708-019B960494DF}">
+            <a:ext uri="{91240B29-F687-4f45-9708-019B960494DF}">
               <a14:hiddenLine xmlns:a14="http://schemas.microsoft.com/office/drawing/2010/main" w="9525">
                 <a:solidFill>
                   <a:srgbClr val="000000"/>
@@ -5707,14 +5985,14 @@
             <a:noFill/>
           </a:ln>
           <a:extLst>
-            <a:ext uri="{909E8E84-426E-40DD-AFC4-6F175D3DCCD1}">
+            <a:ext uri="{909E8E84-426E-40dd-AFC4-6F175D3DCCD1}">
               <a14:hiddenFill xmlns:a14="http://schemas.microsoft.com/office/drawing/2010/main">
                 <a:solidFill>
                   <a:srgbClr val="FFFFFF"/>
                 </a:solidFill>
               </a14:hiddenFill>
             </a:ext>
-            <a:ext uri="{91240B29-F687-4F45-9708-019B960494DF}">
+            <a:ext uri="{91240B29-F687-4f45-9708-019B960494DF}">
               <a14:hiddenLine xmlns:a14="http://schemas.microsoft.com/office/drawing/2010/main" w="9525">
                 <a:solidFill>
                   <a:srgbClr val="000000"/>
@@ -5758,7 +6036,7 @@
           </a:prstGeom>
           <a:noFill/>
           <a:extLst>
-            <a:ext uri="{909E8E84-426E-40DD-AFC4-6F175D3DCCD1}">
+            <a:ext uri="{909E8E84-426E-40dd-AFC4-6F175D3DCCD1}">
               <a14:hiddenFill xmlns:a14="http://schemas.microsoft.com/office/drawing/2010/main">
                 <a:solidFill>
                   <a:srgbClr val="FFFFFF"/>
@@ -5833,7 +6111,7 @@
           <p:cNvPr id="2" name="Title 1">
             <a:extLst>
               <a:ext uri="{FF2B5EF4-FFF2-40B4-BE49-F238E27FC236}">
-                <a16:creationId xmlns:a16="http://schemas.microsoft.com/office/drawing/2014/main" id="{0A3A8724-7894-4017-9060-DCB06C0A44DB}"/>
+                <a16:creationId xmlns:a16="http://schemas.microsoft.com/office/drawing/2014/main" xmlns="" id="{0A3A8724-7894-4017-9060-DCB06C0A44DB}"/>
               </a:ext>
             </a:extLst>
           </p:cNvPr>
@@ -5861,7 +6139,7 @@
           <p:cNvPr id="3" name="Content Placeholder 2">
             <a:extLst>
               <a:ext uri="{FF2B5EF4-FFF2-40B4-BE49-F238E27FC236}">
-                <a16:creationId xmlns:a16="http://schemas.microsoft.com/office/drawing/2014/main" id="{E7D15EFD-F7F1-4563-B5D9-AA50D655CFFE}"/>
+                <a16:creationId xmlns:a16="http://schemas.microsoft.com/office/drawing/2014/main" xmlns="" id="{E7D15EFD-F7F1-4563-B5D9-AA50D655CFFE}"/>
               </a:ext>
             </a:extLst>
           </p:cNvPr>
@@ -5889,8 +6167,19 @@
           </a:p>
           <a:p>
             <a:r>
+              <a:rPr lang="en-GB" sz="2400" dirty="0" smtClean="0"/>
+              <a:t>9:00 Registration</a:t>
+            </a:r>
+            <a:endParaRPr lang="en-GB" sz="2400" dirty="0" smtClean="0"/>
+          </a:p>
+          <a:p>
+            <a:r>
+              <a:rPr lang="en-GB" sz="2400" dirty="0" smtClean="0"/>
+              <a:t>09:30 </a:t>
+            </a:r>
+            <a:r>
               <a:rPr lang="en-GB" sz="2400" dirty="0"/>
-              <a:t>09:30 Automating tasks with the Unix shell</a:t>
+              <a:t>Automating tasks with the Unix shell</a:t>
             </a:r>
           </a:p>
           <a:p>
@@ -5930,7 +6219,7 @@
           <p:cNvPr id="4" name="Content Placeholder 2">
             <a:extLst>
               <a:ext uri="{FF2B5EF4-FFF2-40B4-BE49-F238E27FC236}">
-                <a16:creationId xmlns:a16="http://schemas.microsoft.com/office/drawing/2014/main" id="{7D5814C1-A55A-4CC5-B9BC-B84132CCF29C}"/>
+                <a16:creationId xmlns:a16="http://schemas.microsoft.com/office/drawing/2014/main" xmlns="" id="{7D5814C1-A55A-4CC5-B9BC-B84132CCF29C}"/>
               </a:ext>
             </a:extLst>
           </p:cNvPr>
@@ -6168,7 +6457,7 @@
           <p:cNvPr id="2" name="Title 1">
             <a:extLst>
               <a:ext uri="{FF2B5EF4-FFF2-40B4-BE49-F238E27FC236}">
-                <a16:creationId xmlns:a16="http://schemas.microsoft.com/office/drawing/2014/main" id="{7D25C9B4-E028-41B5-94BB-79B216304A17}"/>
+                <a16:creationId xmlns:a16="http://schemas.microsoft.com/office/drawing/2014/main" xmlns="" id="{7D25C9B4-E028-41B5-94BB-79B216304A17}"/>
               </a:ext>
             </a:extLst>
           </p:cNvPr>
@@ -6198,7 +6487,7 @@
           <p:cNvPr id="3" name="Content Placeholder 2">
             <a:extLst>
               <a:ext uri="{FF2B5EF4-FFF2-40B4-BE49-F238E27FC236}">
-                <a16:creationId xmlns:a16="http://schemas.microsoft.com/office/drawing/2014/main" id="{E0ECBFBA-3CD3-4A65-AFC6-38F0C4B3D9D5}"/>
+                <a16:creationId xmlns:a16="http://schemas.microsoft.com/office/drawing/2014/main" xmlns="" id="{E0ECBFBA-3CD3-4A65-AFC6-38F0C4B3D9D5}"/>
               </a:ext>
             </a:extLst>
           </p:cNvPr>
@@ -6331,7 +6620,7 @@
           <p:cNvPr id="2" name="Title 1">
             <a:extLst>
               <a:ext uri="{FF2B5EF4-FFF2-40B4-BE49-F238E27FC236}">
-                <a16:creationId xmlns:a16="http://schemas.microsoft.com/office/drawing/2014/main" id="{0D902B0C-009A-4ABF-80F7-E531D3320577}"/>
+                <a16:creationId xmlns:a16="http://schemas.microsoft.com/office/drawing/2014/main" xmlns="" id="{0D902B0C-009A-4ABF-80F7-E531D3320577}"/>
               </a:ext>
             </a:extLst>
           </p:cNvPr>
@@ -6361,7 +6650,7 @@
           <p:cNvPr id="2050" name="Picture 2" descr="http://jonudell.net/images/alternate-view-of-automation.png">
             <a:extLst>
               <a:ext uri="{FF2B5EF4-FFF2-40B4-BE49-F238E27FC236}">
-                <a16:creationId xmlns:a16="http://schemas.microsoft.com/office/drawing/2014/main" id="{BDDC17F6-4561-40A1-A801-B2D36CA6A3AD}"/>
+                <a16:creationId xmlns:a16="http://schemas.microsoft.com/office/drawing/2014/main" xmlns="" id="{BDDC17F6-4561-40A1-A801-B2D36CA6A3AD}"/>
               </a:ext>
             </a:extLst>
           </p:cNvPr>
@@ -6393,7 +6682,7 @@
           </a:prstGeom>
           <a:noFill/>
           <a:extLst>
-            <a:ext uri="{909E8E84-426E-40DD-AFC4-6F175D3DCCD1}">
+            <a:ext uri="{909E8E84-426E-40dd-AFC4-6F175D3DCCD1}">
               <a14:hiddenFill xmlns:a14="http://schemas.microsoft.com/office/drawing/2010/main">
                 <a:solidFill>
                   <a:srgbClr val="FFFFFF"/>
@@ -6408,7 +6697,7 @@
           <p:cNvPr id="5" name="TextBox 4">
             <a:extLst>
               <a:ext uri="{FF2B5EF4-FFF2-40B4-BE49-F238E27FC236}">
-                <a16:creationId xmlns:a16="http://schemas.microsoft.com/office/drawing/2014/main" id="{22CB5617-9290-470A-BC4B-C3E68878A512}"/>
+                <a16:creationId xmlns:a16="http://schemas.microsoft.com/office/drawing/2014/main" xmlns="" id="{22CB5617-9290-470A-BC4B-C3E68878A512}"/>
               </a:ext>
             </a:extLst>
           </p:cNvPr>
@@ -6479,7 +6768,7 @@
           <p:cNvPr id="2" name="Title 1">
             <a:extLst>
               <a:ext uri="{FF2B5EF4-FFF2-40B4-BE49-F238E27FC236}">
-                <a16:creationId xmlns:a16="http://schemas.microsoft.com/office/drawing/2014/main" id="{5DF714A7-555A-4F38-A4E2-548F2F48EC56}"/>
+                <a16:creationId xmlns:a16="http://schemas.microsoft.com/office/drawing/2014/main" xmlns="" id="{5DF714A7-555A-4F38-A4E2-548F2F48EC56}"/>
               </a:ext>
             </a:extLst>
           </p:cNvPr>
@@ -6509,7 +6798,7 @@
           <p:cNvPr id="4" name="Picture 2" descr="http://phdcomics.com/comics/archive/phd031214s.gif">
             <a:extLst>
               <a:ext uri="{FF2B5EF4-FFF2-40B4-BE49-F238E27FC236}">
-                <a16:creationId xmlns:a16="http://schemas.microsoft.com/office/drawing/2014/main" id="{61341FF4-1213-4172-ABD2-1D4F97D5D3AA}"/>
+                <a16:creationId xmlns:a16="http://schemas.microsoft.com/office/drawing/2014/main" xmlns="" id="{61341FF4-1213-4172-ABD2-1D4F97D5D3AA}"/>
               </a:ext>
             </a:extLst>
           </p:cNvPr>
@@ -6541,7 +6830,7 @@
           </a:prstGeom>
           <a:noFill/>
           <a:extLst>
-            <a:ext uri="{909E8E84-426E-40DD-AFC4-6F175D3DCCD1}">
+            <a:ext uri="{909E8E84-426E-40dd-AFC4-6F175D3DCCD1}">
               <a14:hiddenFill xmlns:a14="http://schemas.microsoft.com/office/drawing/2010/main">
                 <a:solidFill>
                   <a:srgbClr val="FFFFFF"/>
@@ -6556,7 +6845,7 @@
           <p:cNvPr id="5" name="TextBox 4">
             <a:extLst>
               <a:ext uri="{FF2B5EF4-FFF2-40B4-BE49-F238E27FC236}">
-                <a16:creationId xmlns:a16="http://schemas.microsoft.com/office/drawing/2014/main" id="{0B2EB249-E396-46F9-863D-FCB09AE6D143}"/>
+                <a16:creationId xmlns:a16="http://schemas.microsoft.com/office/drawing/2014/main" xmlns="" id="{0B2EB249-E396-46F9-863D-FCB09AE6D143}"/>
               </a:ext>
             </a:extLst>
           </p:cNvPr>
@@ -6627,7 +6916,7 @@
           <p:cNvPr id="2" name="Title 1">
             <a:extLst>
               <a:ext uri="{FF2B5EF4-FFF2-40B4-BE49-F238E27FC236}">
-                <a16:creationId xmlns:a16="http://schemas.microsoft.com/office/drawing/2014/main" id="{8FB7CE3D-FACE-4C28-AA7D-99F08FA9A55A}"/>
+                <a16:creationId xmlns:a16="http://schemas.microsoft.com/office/drawing/2014/main" xmlns="" id="{8FB7CE3D-FACE-4C28-AA7D-99F08FA9A55A}"/>
               </a:ext>
             </a:extLst>
           </p:cNvPr>
@@ -6657,7 +6946,7 @@
           <p:cNvPr id="4" name="Picture 2" descr="http://www.phdcomics.com/comics/archive/phd101212s.gif">
             <a:extLst>
               <a:ext uri="{FF2B5EF4-FFF2-40B4-BE49-F238E27FC236}">
-                <a16:creationId xmlns:a16="http://schemas.microsoft.com/office/drawing/2014/main" id="{226DEA4D-7787-4208-8E67-5D65846B4678}"/>
+                <a16:creationId xmlns:a16="http://schemas.microsoft.com/office/drawing/2014/main" xmlns="" id="{226DEA4D-7787-4208-8E67-5D65846B4678}"/>
               </a:ext>
             </a:extLst>
           </p:cNvPr>
@@ -6689,7 +6978,7 @@
           </a:prstGeom>
           <a:noFill/>
           <a:extLst>
-            <a:ext uri="{909E8E84-426E-40DD-AFC4-6F175D3DCCD1}">
+            <a:ext uri="{909E8E84-426E-40dd-AFC4-6F175D3DCCD1}">
               <a14:hiddenFill xmlns:a14="http://schemas.microsoft.com/office/drawing/2010/main">
                 <a:solidFill>
                   <a:srgbClr val="FFFFFF"/>
@@ -6704,7 +6993,7 @@
           <p:cNvPr id="5" name="TextBox 4">
             <a:extLst>
               <a:ext uri="{FF2B5EF4-FFF2-40B4-BE49-F238E27FC236}">
-                <a16:creationId xmlns:a16="http://schemas.microsoft.com/office/drawing/2014/main" id="{CDEBD24E-7903-4E5F-BE6A-198716D43DD8}"/>
+                <a16:creationId xmlns:a16="http://schemas.microsoft.com/office/drawing/2014/main" xmlns="" id="{CDEBD24E-7903-4E5F-BE6A-198716D43DD8}"/>
               </a:ext>
             </a:extLst>
           </p:cNvPr>
@@ -6745,7 +7034,7 @@
           <p:cNvPr id="6" name="Picture 2" descr="http://www.phdcomics.com/comics/archive/phd052810s.gif">
             <a:extLst>
               <a:ext uri="{FF2B5EF4-FFF2-40B4-BE49-F238E27FC236}">
-                <a16:creationId xmlns:a16="http://schemas.microsoft.com/office/drawing/2014/main" id="{5CC91F2C-8320-47AE-9FC5-1326AA718B8E}"/>
+                <a16:creationId xmlns:a16="http://schemas.microsoft.com/office/drawing/2014/main" xmlns="" id="{5CC91F2C-8320-47AE-9FC5-1326AA718B8E}"/>
               </a:ext>
             </a:extLst>
           </p:cNvPr>
@@ -6777,7 +7066,7 @@
           </a:prstGeom>
           <a:noFill/>
           <a:extLst>
-            <a:ext uri="{909E8E84-426E-40DD-AFC4-6F175D3DCCD1}">
+            <a:ext uri="{909E8E84-426E-40dd-AFC4-6F175D3DCCD1}">
               <a14:hiddenFill xmlns:a14="http://schemas.microsoft.com/office/drawing/2010/main">
                 <a:solidFill>
                   <a:srgbClr val="FFFFFF"/>
@@ -6792,7 +7081,7 @@
           <p:cNvPr id="7" name="TextBox 6">
             <a:extLst>
               <a:ext uri="{FF2B5EF4-FFF2-40B4-BE49-F238E27FC236}">
-                <a16:creationId xmlns:a16="http://schemas.microsoft.com/office/drawing/2014/main" id="{4589B974-EC77-4794-B079-B733C53C0D60}"/>
+                <a16:creationId xmlns:a16="http://schemas.microsoft.com/office/drawing/2014/main" xmlns="" id="{4589B974-EC77-4794-B079-B733C53C0D60}"/>
               </a:ext>
             </a:extLst>
           </p:cNvPr>
@@ -6901,14 +7190,14 @@
             <a:noFill/>
           </a:ln>
           <a:extLst>
-            <a:ext uri="{909E8E84-426E-40DD-AFC4-6F175D3DCCD1}">
+            <a:ext uri="{909E8E84-426E-40dd-AFC4-6F175D3DCCD1}">
               <a14:hiddenFill xmlns:a14="http://schemas.microsoft.com/office/drawing/2010/main">
                 <a:solidFill>
                   <a:srgbClr val="FFFFFF"/>
                 </a:solidFill>
               </a14:hiddenFill>
             </a:ext>
-            <a:ext uri="{91240B29-F687-4F45-9708-019B960494DF}">
+            <a:ext uri="{91240B29-F687-4f45-9708-019B960494DF}">
               <a14:hiddenLine xmlns:a14="http://schemas.microsoft.com/office/drawing/2010/main" w="9525">
                 <a:solidFill>
                   <a:srgbClr val="000000"/>
@@ -7149,7 +7438,7 @@
           <p:cNvPr id="15" name="Picture 14">
             <a:extLst>
               <a:ext uri="{FF2B5EF4-FFF2-40B4-BE49-F238E27FC236}">
-                <a16:creationId xmlns:a16="http://schemas.microsoft.com/office/drawing/2014/main" id="{08DC44CE-9C3E-4368-B2EA-BF9874218D4B}"/>
+                <a16:creationId xmlns:a16="http://schemas.microsoft.com/office/drawing/2014/main" xmlns="" id="{08DC44CE-9C3E-4368-B2EA-BF9874218D4B}"/>
               </a:ext>
             </a:extLst>
           </p:cNvPr>
@@ -7179,7 +7468,7 @@
           <p:cNvPr id="16" name="Picture 15">
             <a:extLst>
               <a:ext uri="{FF2B5EF4-FFF2-40B4-BE49-F238E27FC236}">
-                <a16:creationId xmlns:a16="http://schemas.microsoft.com/office/drawing/2014/main" id="{24C8BC12-2BBB-421D-8DA4-5E2EE055CBA6}"/>
+                <a16:creationId xmlns:a16="http://schemas.microsoft.com/office/drawing/2014/main" xmlns="" id="{24C8BC12-2BBB-421D-8DA4-5E2EE055CBA6}"/>
               </a:ext>
             </a:extLst>
           </p:cNvPr>
@@ -7209,7 +7498,7 @@
           <p:cNvPr id="17" name="Picture 16">
             <a:extLst>
               <a:ext uri="{FF2B5EF4-FFF2-40B4-BE49-F238E27FC236}">
-                <a16:creationId xmlns:a16="http://schemas.microsoft.com/office/drawing/2014/main" id="{A24DAEAC-4C99-4CE0-9DF9-5C36C43F5874}"/>
+                <a16:creationId xmlns:a16="http://schemas.microsoft.com/office/drawing/2014/main" xmlns="" id="{A24DAEAC-4C99-4CE0-9DF9-5C36C43F5874}"/>
               </a:ext>
             </a:extLst>
           </p:cNvPr>
@@ -7239,7 +7528,7 @@
           <p:cNvPr id="18" name="Picture 17">
             <a:extLst>
               <a:ext uri="{FF2B5EF4-FFF2-40B4-BE49-F238E27FC236}">
-                <a16:creationId xmlns:a16="http://schemas.microsoft.com/office/drawing/2014/main" id="{BC8E1782-2ABA-4F9C-99B8-4892A2A1E4EA}"/>
+                <a16:creationId xmlns:a16="http://schemas.microsoft.com/office/drawing/2014/main" xmlns="" id="{BC8E1782-2ABA-4F9C-99B8-4892A2A1E4EA}"/>
               </a:ext>
             </a:extLst>
           </p:cNvPr>
@@ -7371,7 +7660,7 @@
           <p:cNvPr id="4" name="TextBox 8">
             <a:extLst>
               <a:ext uri="{FF2B5EF4-FFF2-40B4-BE49-F238E27FC236}">
-                <a16:creationId xmlns:a16="http://schemas.microsoft.com/office/drawing/2014/main" id="{1CBD25CC-4B33-4BA6-A3AE-017971463AB2}"/>
+                <a16:creationId xmlns:a16="http://schemas.microsoft.com/office/drawing/2014/main" xmlns="" id="{1CBD25CC-4B33-4BA6-A3AE-017971463AB2}"/>
               </a:ext>
             </a:extLst>
           </p:cNvPr>
@@ -7393,14 +7682,14 @@
             <a:noFill/>
           </a:ln>
           <a:extLst>
-            <a:ext uri="{909E8E84-426E-40DD-AFC4-6F175D3DCCD1}">
+            <a:ext uri="{909E8E84-426E-40dd-AFC4-6F175D3DCCD1}">
               <a14:hiddenFill xmlns:a14="http://schemas.microsoft.com/office/drawing/2010/main">
                 <a:solidFill>
                   <a:srgbClr val="FFFFFF"/>
                 </a:solidFill>
               </a14:hiddenFill>
             </a:ext>
-            <a:ext uri="{91240B29-F687-4F45-9708-019B960494DF}">
+            <a:ext uri="{91240B29-F687-4f45-9708-019B960494DF}">
               <a14:hiddenLine xmlns:a14="http://schemas.microsoft.com/office/drawing/2010/main" w="9525">
                 <a:solidFill>
                   <a:srgbClr val="000000"/>
@@ -7644,7 +7933,7 @@
           <p:cNvPr id="5" name="Picture 4">
             <a:extLst>
               <a:ext uri="{FF2B5EF4-FFF2-40B4-BE49-F238E27FC236}">
-                <a16:creationId xmlns:a16="http://schemas.microsoft.com/office/drawing/2014/main" id="{66C832FE-248D-4046-B8A5-17E4D1A15FE8}"/>
+                <a16:creationId xmlns:a16="http://schemas.microsoft.com/office/drawing/2014/main" xmlns="" id="{66C832FE-248D-4046-B8A5-17E4D1A15FE8}"/>
               </a:ext>
             </a:extLst>
           </p:cNvPr>
@@ -7682,7 +7971,7 @@
   <p:timing>
     <p:tnLst>
       <p:par>
-        <p:cTn id="1" dur="indefinite" restart="never" nodeType="tmRoot">
+        <p:cTn xmlns:p14="http://schemas.microsoft.com/office/powerpoint/2010/main" id="1" dur="indefinite" restart="never" nodeType="tmRoot">
           <p:childTnLst>
             <p:seq concurrent="1" nextAc="seek">
               <p:cTn id="2" dur="indefinite" nodeType="mainSeq">

</xml_diff>